<commit_message>
Nvigation starting to work Can authenticate and create session. Authentication needed to navigate to MyClasses.
</commit_message>
<xml_diff>
--- a/Class_Project/Documentation/Mock Up.pptx
+++ b/Class_Project/Documentation/Mock Up.pptx
@@ -245,7 +245,7 @@
           <a:p>
             <a:fld id="{398AA68B-B513-4080-B87C-814425C84251}" type="datetimeFigureOut">
               <a:rPr lang="en-US" smtClean="0"/>
-              <a:t>5/21/2018</a:t>
+              <a:t>5/25/2018</a:t>
             </a:fld>
             <a:endParaRPr lang="en-US"/>
           </a:p>
@@ -413,7 +413,7 @@
           <a:p>
             <a:fld id="{398AA68B-B513-4080-B87C-814425C84251}" type="datetimeFigureOut">
               <a:rPr lang="en-US" smtClean="0"/>
-              <a:t>5/21/2018</a:t>
+              <a:t>5/25/2018</a:t>
             </a:fld>
             <a:endParaRPr lang="en-US"/>
           </a:p>
@@ -591,7 +591,7 @@
           <a:p>
             <a:fld id="{398AA68B-B513-4080-B87C-814425C84251}" type="datetimeFigureOut">
               <a:rPr lang="en-US" smtClean="0"/>
-              <a:t>5/21/2018</a:t>
+              <a:t>5/25/2018</a:t>
             </a:fld>
             <a:endParaRPr lang="en-US"/>
           </a:p>
@@ -759,7 +759,7 @@
           <a:p>
             <a:fld id="{398AA68B-B513-4080-B87C-814425C84251}" type="datetimeFigureOut">
               <a:rPr lang="en-US" smtClean="0"/>
-              <a:t>5/21/2018</a:t>
+              <a:t>5/25/2018</a:t>
             </a:fld>
             <a:endParaRPr lang="en-US"/>
           </a:p>
@@ -1004,7 +1004,7 @@
           <a:p>
             <a:fld id="{398AA68B-B513-4080-B87C-814425C84251}" type="datetimeFigureOut">
               <a:rPr lang="en-US" smtClean="0"/>
-              <a:t>5/21/2018</a:t>
+              <a:t>5/25/2018</a:t>
             </a:fld>
             <a:endParaRPr lang="en-US"/>
           </a:p>
@@ -1233,7 +1233,7 @@
           <a:p>
             <a:fld id="{398AA68B-B513-4080-B87C-814425C84251}" type="datetimeFigureOut">
               <a:rPr lang="en-US" smtClean="0"/>
-              <a:t>5/21/2018</a:t>
+              <a:t>5/25/2018</a:t>
             </a:fld>
             <a:endParaRPr lang="en-US"/>
           </a:p>
@@ -1597,7 +1597,7 @@
           <a:p>
             <a:fld id="{398AA68B-B513-4080-B87C-814425C84251}" type="datetimeFigureOut">
               <a:rPr lang="en-US" smtClean="0"/>
-              <a:t>5/21/2018</a:t>
+              <a:t>5/25/2018</a:t>
             </a:fld>
             <a:endParaRPr lang="en-US"/>
           </a:p>
@@ -1714,7 +1714,7 @@
           <a:p>
             <a:fld id="{398AA68B-B513-4080-B87C-814425C84251}" type="datetimeFigureOut">
               <a:rPr lang="en-US" smtClean="0"/>
-              <a:t>5/21/2018</a:t>
+              <a:t>5/25/2018</a:t>
             </a:fld>
             <a:endParaRPr lang="en-US"/>
           </a:p>
@@ -1809,7 +1809,7 @@
           <a:p>
             <a:fld id="{398AA68B-B513-4080-B87C-814425C84251}" type="datetimeFigureOut">
               <a:rPr lang="en-US" smtClean="0"/>
-              <a:t>5/21/2018</a:t>
+              <a:t>5/25/2018</a:t>
             </a:fld>
             <a:endParaRPr lang="en-US"/>
           </a:p>
@@ -2084,7 +2084,7 @@
           <a:p>
             <a:fld id="{398AA68B-B513-4080-B87C-814425C84251}" type="datetimeFigureOut">
               <a:rPr lang="en-US" smtClean="0"/>
-              <a:t>5/21/2018</a:t>
+              <a:t>5/25/2018</a:t>
             </a:fld>
             <a:endParaRPr lang="en-US"/>
           </a:p>
@@ -2336,7 +2336,7 @@
           <a:p>
             <a:fld id="{398AA68B-B513-4080-B87C-814425C84251}" type="datetimeFigureOut">
               <a:rPr lang="en-US" smtClean="0"/>
-              <a:t>5/21/2018</a:t>
+              <a:t>5/25/2018</a:t>
             </a:fld>
             <a:endParaRPr lang="en-US"/>
           </a:p>
@@ -2547,7 +2547,7 @@
           <a:p>
             <a:fld id="{398AA68B-B513-4080-B87C-814425C84251}" type="datetimeFigureOut">
               <a:rPr lang="en-US" smtClean="0"/>
-              <a:t>5/21/2018</a:t>
+              <a:t>5/25/2018</a:t>
             </a:fld>
             <a:endParaRPr lang="en-US"/>
           </a:p>
@@ -3950,13 +3950,8 @@
           <a:p>
             <a:r>
               <a:rPr lang="en-US" b="1" dirty="0"/>
-              <a:t>Compiler Construction (</a:t>
-            </a:r>
-            <a:r>
-              <a:rPr lang="en-US" b="1" dirty="0"/>
-              <a:t>CSC 460/660): Class ID 35612</a:t>
-            </a:r>
-            <a:endParaRPr lang="en-US" b="1" dirty="0"/>
+              <a:t>Compiler Construction (CSC 460/660): Class ID 35612</a:t>
+            </a:r>
           </a:p>
         </p:txBody>
       </p:sp>

</xml_diff>